<commit_message>
change diagrams in dg to reflect current version
</commit_message>
<xml_diff>
--- a/docs/diagrams/ModelComponentClassDiagram.pptx
+++ b/docs/diagrams/ModelComponentClassDiagram.pptx
@@ -208,7 +208,7 @@
           <a:p>
             <a:fld id="{F5CC4B3F-88C1-4FFA-B1B6-F41C21DC6924}" type="datetimeFigureOut">
               <a:rPr lang="en-US" smtClean="0"/>
-              <a:t>9/4/17</a:t>
+              <a:t>11/11/2017</a:t>
             </a:fld>
             <a:endParaRPr lang="en-US"/>
           </a:p>
@@ -657,7 +657,7 @@
           <a:p>
             <a:fld id="{78C97017-6FC3-485B-9764-EAC9E56C1D49}" type="datetimeFigureOut">
               <a:rPr lang="en-US" smtClean="0"/>
-              <a:t>9/4/17</a:t>
+              <a:t>11/11/2017</a:t>
             </a:fld>
             <a:endParaRPr lang="en-US"/>
           </a:p>
@@ -827,7 +827,7 @@
           <a:p>
             <a:fld id="{78C97017-6FC3-485B-9764-EAC9E56C1D49}" type="datetimeFigureOut">
               <a:rPr lang="en-US" smtClean="0"/>
-              <a:t>9/4/17</a:t>
+              <a:t>11/11/2017</a:t>
             </a:fld>
             <a:endParaRPr lang="en-US"/>
           </a:p>
@@ -1007,7 +1007,7 @@
           <a:p>
             <a:fld id="{78C97017-6FC3-485B-9764-EAC9E56C1D49}" type="datetimeFigureOut">
               <a:rPr lang="en-US" smtClean="0"/>
-              <a:t>9/4/17</a:t>
+              <a:t>11/11/2017</a:t>
             </a:fld>
             <a:endParaRPr lang="en-US"/>
           </a:p>
@@ -1177,7 +1177,7 @@
           <a:p>
             <a:fld id="{78C97017-6FC3-485B-9764-EAC9E56C1D49}" type="datetimeFigureOut">
               <a:rPr lang="en-US" smtClean="0"/>
-              <a:t>9/4/17</a:t>
+              <a:t>11/11/2017</a:t>
             </a:fld>
             <a:endParaRPr lang="en-US"/>
           </a:p>
@@ -1423,7 +1423,7 @@
           <a:p>
             <a:fld id="{78C97017-6FC3-485B-9764-EAC9E56C1D49}" type="datetimeFigureOut">
               <a:rPr lang="en-US" smtClean="0"/>
-              <a:t>9/4/17</a:t>
+              <a:t>11/11/2017</a:t>
             </a:fld>
             <a:endParaRPr lang="en-US"/>
           </a:p>
@@ -1711,7 +1711,7 @@
           <a:p>
             <a:fld id="{78C97017-6FC3-485B-9764-EAC9E56C1D49}" type="datetimeFigureOut">
               <a:rPr lang="en-US" smtClean="0"/>
-              <a:t>9/4/17</a:t>
+              <a:t>11/11/2017</a:t>
             </a:fld>
             <a:endParaRPr lang="en-US"/>
           </a:p>
@@ -2133,7 +2133,7 @@
           <a:p>
             <a:fld id="{78C97017-6FC3-485B-9764-EAC9E56C1D49}" type="datetimeFigureOut">
               <a:rPr lang="en-US" smtClean="0"/>
-              <a:t>9/4/17</a:t>
+              <a:t>11/11/2017</a:t>
             </a:fld>
             <a:endParaRPr lang="en-US"/>
           </a:p>
@@ -2251,7 +2251,7 @@
           <a:p>
             <a:fld id="{78C97017-6FC3-485B-9764-EAC9E56C1D49}" type="datetimeFigureOut">
               <a:rPr lang="en-US" smtClean="0"/>
-              <a:t>9/4/17</a:t>
+              <a:t>11/11/2017</a:t>
             </a:fld>
             <a:endParaRPr lang="en-US"/>
           </a:p>
@@ -2346,7 +2346,7 @@
           <a:p>
             <a:fld id="{78C97017-6FC3-485B-9764-EAC9E56C1D49}" type="datetimeFigureOut">
               <a:rPr lang="en-US" smtClean="0"/>
-              <a:t>9/4/17</a:t>
+              <a:t>11/11/2017</a:t>
             </a:fld>
             <a:endParaRPr lang="en-US"/>
           </a:p>
@@ -2623,7 +2623,7 @@
           <a:p>
             <a:fld id="{78C97017-6FC3-485B-9764-EAC9E56C1D49}" type="datetimeFigureOut">
               <a:rPr lang="en-US" smtClean="0"/>
-              <a:t>9/4/17</a:t>
+              <a:t>11/11/2017</a:t>
             </a:fld>
             <a:endParaRPr lang="en-US"/>
           </a:p>
@@ -2876,7 +2876,7 @@
           <a:p>
             <a:fld id="{78C97017-6FC3-485B-9764-EAC9E56C1D49}" type="datetimeFigureOut">
               <a:rPr lang="en-US" smtClean="0"/>
-              <a:t>9/4/17</a:t>
+              <a:t>11/11/2017</a:t>
             </a:fld>
             <a:endParaRPr lang="en-US"/>
           </a:p>
@@ -3089,7 +3089,7 @@
           <a:p>
             <a:fld id="{78C97017-6FC3-485B-9764-EAC9E56C1D49}" type="datetimeFigureOut">
               <a:rPr lang="en-US" smtClean="0"/>
-              <a:t>9/4/17</a:t>
+              <a:t>11/11/2017</a:t>
             </a:fld>
             <a:endParaRPr lang="en-US"/>
           </a:p>
@@ -3472,8 +3472,8 @@
         </p:nvSpPr>
         <p:spPr>
           <a:xfrm>
-            <a:off x="1119865" y="1727200"/>
-            <a:ext cx="7490735" cy="2997200"/>
+            <a:off x="1119865" y="443105"/>
+            <a:ext cx="7490735" cy="5119495"/>
           </a:xfrm>
           <a:prstGeom prst="roundRect">
             <a:avLst>
@@ -5203,15 +5203,12 @@
       <p:cxnSp>
         <p:nvCxnSpPr>
           <p:cNvPr id="86" name="Elbow Connector 85"/>
-          <p:cNvCxnSpPr>
-            <a:stCxn id="78" idx="3"/>
-            <a:endCxn id="85" idx="1"/>
-          </p:cNvCxnSpPr>
+          <p:cNvCxnSpPr/>
           <p:nvPr/>
         </p:nvCxnSpPr>
         <p:spPr>
           <a:xfrm>
-            <a:off x="7277995" y="3034891"/>
+            <a:off x="7277995" y="3040052"/>
             <a:ext cx="434402" cy="641172"/>
           </a:xfrm>
           <a:prstGeom prst="bentConnector3">
@@ -5885,7 +5882,1491 @@
         </p:nvSpPr>
         <p:spPr>
           <a:xfrm>
-            <a:off x="6667770" y="3210194"/>
+            <a:off x="6937883" y="3217915"/>
+            <a:ext cx="189257" cy="178683"/>
+          </a:xfrm>
+          <a:prstGeom prst="rect">
+            <a:avLst/>
+          </a:prstGeom>
+          <a:noFill/>
+        </p:spPr>
+        <p:txBody>
+          <a:bodyPr wrap="square" lIns="0" tIns="0" rIns="0" bIns="0" rtlCol="0">
+            <a:noAutofit/>
+          </a:bodyPr>
+          <a:lstStyle/>
+          <a:p>
+            <a:pPr algn="ctr"/>
+            <a:r>
+              <a:rPr lang="en-US" sz="1100" dirty="0" smtClean="0">
+                <a:solidFill>
+                  <a:srgbClr val="7030A0"/>
+                </a:solidFill>
+              </a:rPr>
+              <a:t>1</a:t>
+            </a:r>
+            <a:endParaRPr lang="en-SG" sz="1100" dirty="0">
+              <a:solidFill>
+                <a:srgbClr val="7030A0"/>
+              </a:solidFill>
+            </a:endParaRPr>
+          </a:p>
+        </p:txBody>
+      </p:sp>
+      <p:sp>
+        <p:nvSpPr>
+          <p:cNvPr id="55" name="Rectangle 8"/>
+          <p:cNvSpPr/>
+          <p:nvPr/>
+        </p:nvSpPr>
+        <p:spPr>
+          <a:xfrm>
+            <a:off x="7712397" y="3856148"/>
+            <a:ext cx="708186" cy="285783"/>
+          </a:xfrm>
+          <a:prstGeom prst="rect">
+            <a:avLst/>
+          </a:prstGeom>
+          <a:ln w="19050">
+            <a:solidFill>
+              <a:srgbClr val="7030A0"/>
+            </a:solidFill>
+          </a:ln>
+          <a:effectLst/>
+        </p:spPr>
+        <p:style>
+          <a:lnRef idx="1">
+            <a:schemeClr val="accent4"/>
+          </a:lnRef>
+          <a:fillRef idx="2">
+            <a:schemeClr val="accent4"/>
+          </a:fillRef>
+          <a:effectRef idx="1">
+            <a:schemeClr val="accent4"/>
+          </a:effectRef>
+          <a:fontRef idx="minor">
+            <a:schemeClr val="dk1"/>
+          </a:fontRef>
+        </p:style>
+        <p:txBody>
+          <a:bodyPr rtlCol="0" anchor="ctr"/>
+          <a:lstStyle/>
+          <a:p>
+            <a:pPr algn="ctr"/>
+            <a:r>
+              <a:rPr lang="en-US" sz="1050" dirty="0" smtClean="0">
+                <a:solidFill>
+                  <a:srgbClr val="7030A0"/>
+                </a:solidFill>
+              </a:rPr>
+              <a:t>Profile</a:t>
+            </a:r>
+            <a:endParaRPr lang="en-SG" sz="1050" dirty="0">
+              <a:solidFill>
+                <a:srgbClr val="7030A0"/>
+              </a:solidFill>
+            </a:endParaRPr>
+          </a:p>
+        </p:txBody>
+      </p:sp>
+      <p:cxnSp>
+        <p:nvCxnSpPr>
+          <p:cNvPr id="22" name="Straight Connector 21"/>
+          <p:cNvCxnSpPr/>
+          <p:nvPr/>
+        </p:nvCxnSpPr>
+        <p:spPr>
+          <a:xfrm>
+            <a:off x="7495196" y="3676062"/>
+            <a:ext cx="0" cy="650620"/>
+          </a:xfrm>
+          <a:prstGeom prst="line">
+            <a:avLst/>
+          </a:prstGeom>
+          <a:ln w="19050">
+            <a:solidFill>
+              <a:srgbClr val="7030A0"/>
+            </a:solidFill>
+          </a:ln>
+        </p:spPr>
+        <p:style>
+          <a:lnRef idx="1">
+            <a:schemeClr val="accent1"/>
+          </a:lnRef>
+          <a:fillRef idx="0">
+            <a:schemeClr val="accent1"/>
+          </a:fillRef>
+          <a:effectRef idx="0">
+            <a:schemeClr val="accent1"/>
+          </a:effectRef>
+          <a:fontRef idx="minor">
+            <a:schemeClr val="tx1"/>
+          </a:fontRef>
+        </p:style>
+      </p:cxnSp>
+      <p:sp>
+        <p:nvSpPr>
+          <p:cNvPr id="88" name="Rectangle 8"/>
+          <p:cNvSpPr/>
+          <p:nvPr/>
+        </p:nvSpPr>
+        <p:spPr>
+          <a:xfrm>
+            <a:off x="7724325" y="4183791"/>
+            <a:ext cx="708186" cy="285783"/>
+          </a:xfrm>
+          <a:prstGeom prst="rect">
+            <a:avLst/>
+          </a:prstGeom>
+          <a:ln w="19050">
+            <a:solidFill>
+              <a:srgbClr val="7030A0"/>
+            </a:solidFill>
+          </a:ln>
+          <a:effectLst/>
+        </p:spPr>
+        <p:style>
+          <a:lnRef idx="1">
+            <a:schemeClr val="accent4"/>
+          </a:lnRef>
+          <a:fillRef idx="2">
+            <a:schemeClr val="accent4"/>
+          </a:fillRef>
+          <a:effectRef idx="1">
+            <a:schemeClr val="accent4"/>
+          </a:effectRef>
+          <a:fontRef idx="minor">
+            <a:schemeClr val="dk1"/>
+          </a:fontRef>
+        </p:style>
+        <p:txBody>
+          <a:bodyPr rtlCol="0" anchor="ctr"/>
+          <a:lstStyle/>
+          <a:p>
+            <a:pPr algn="ctr"/>
+            <a:r>
+              <a:rPr lang="en-US" sz="1050" dirty="0" smtClean="0">
+                <a:solidFill>
+                  <a:srgbClr val="7030A0"/>
+                </a:solidFill>
+              </a:rPr>
+              <a:t>Birthday</a:t>
+            </a:r>
+            <a:endParaRPr lang="en-SG" sz="1050" dirty="0">
+              <a:solidFill>
+                <a:srgbClr val="7030A0"/>
+              </a:solidFill>
+            </a:endParaRPr>
+          </a:p>
+        </p:txBody>
+      </p:sp>
+      <p:cxnSp>
+        <p:nvCxnSpPr>
+          <p:cNvPr id="26" name="Straight Arrow Connector 25"/>
+          <p:cNvCxnSpPr>
+            <a:endCxn id="55" idx="1"/>
+          </p:cNvCxnSpPr>
+          <p:nvPr/>
+        </p:nvCxnSpPr>
+        <p:spPr>
+          <a:xfrm>
+            <a:off x="7495196" y="3997134"/>
+            <a:ext cx="217201" cy="1906"/>
+          </a:xfrm>
+          <a:prstGeom prst="straightConnector1">
+            <a:avLst/>
+          </a:prstGeom>
+          <a:ln w="19050">
+            <a:solidFill>
+              <a:srgbClr val="7030A0"/>
+            </a:solidFill>
+            <a:tailEnd type="triangle"/>
+          </a:ln>
+        </p:spPr>
+        <p:style>
+          <a:lnRef idx="1">
+            <a:schemeClr val="accent1"/>
+          </a:lnRef>
+          <a:fillRef idx="0">
+            <a:schemeClr val="accent1"/>
+          </a:fillRef>
+          <a:effectRef idx="0">
+            <a:schemeClr val="accent1"/>
+          </a:effectRef>
+          <a:fontRef idx="minor">
+            <a:schemeClr val="tx1"/>
+          </a:fontRef>
+        </p:style>
+      </p:cxnSp>
+      <p:cxnSp>
+        <p:nvCxnSpPr>
+          <p:cNvPr id="89" name="Straight Arrow Connector 88"/>
+          <p:cNvCxnSpPr/>
+          <p:nvPr/>
+        </p:nvCxnSpPr>
+        <p:spPr>
+          <a:xfrm>
+            <a:off x="7495195" y="4324776"/>
+            <a:ext cx="217201" cy="1906"/>
+          </a:xfrm>
+          <a:prstGeom prst="straightConnector1">
+            <a:avLst/>
+          </a:prstGeom>
+          <a:ln w="19050">
+            <a:solidFill>
+              <a:srgbClr val="7030A0"/>
+            </a:solidFill>
+            <a:tailEnd type="triangle"/>
+          </a:ln>
+        </p:spPr>
+        <p:style>
+          <a:lnRef idx="1">
+            <a:schemeClr val="accent1"/>
+          </a:lnRef>
+          <a:fillRef idx="0">
+            <a:schemeClr val="accent1"/>
+          </a:fillRef>
+          <a:effectRef idx="0">
+            <a:schemeClr val="accent1"/>
+          </a:effectRef>
+          <a:fontRef idx="minor">
+            <a:schemeClr val="tx1"/>
+          </a:fontRef>
+        </p:style>
+      </p:cxnSp>
+      <p:sp>
+        <p:nvSpPr>
+          <p:cNvPr id="90" name="Rectangle 8"/>
+          <p:cNvSpPr/>
+          <p:nvPr/>
+        </p:nvSpPr>
+        <p:spPr>
+          <a:xfrm>
+            <a:off x="4420986" y="1048485"/>
+            <a:ext cx="1156969" cy="346760"/>
+          </a:xfrm>
+          <a:prstGeom prst="rect">
+            <a:avLst/>
+          </a:prstGeom>
+          <a:ln w="19050">
+            <a:solidFill>
+              <a:srgbClr val="7030A0"/>
+            </a:solidFill>
+          </a:ln>
+          <a:effectLst/>
+        </p:spPr>
+        <p:style>
+          <a:lnRef idx="1">
+            <a:schemeClr val="accent4"/>
+          </a:lnRef>
+          <a:fillRef idx="2">
+            <a:schemeClr val="accent4"/>
+          </a:fillRef>
+          <a:effectRef idx="1">
+            <a:schemeClr val="accent4"/>
+          </a:effectRef>
+          <a:fontRef idx="minor">
+            <a:schemeClr val="dk1"/>
+          </a:fontRef>
+        </p:style>
+        <p:txBody>
+          <a:bodyPr rtlCol="0" anchor="ctr"/>
+          <a:lstStyle/>
+          <a:p>
+            <a:pPr algn="ctr"/>
+            <a:r>
+              <a:rPr lang="en-US" sz="1050" dirty="0" err="1" smtClean="0">
+                <a:solidFill>
+                  <a:srgbClr val="7030A0"/>
+                </a:solidFill>
+              </a:rPr>
+              <a:t>EventList</a:t>
+            </a:r>
+            <a:endParaRPr lang="en-SG" sz="1050" dirty="0">
+              <a:solidFill>
+                <a:srgbClr val="7030A0"/>
+              </a:solidFill>
+            </a:endParaRPr>
+          </a:p>
+        </p:txBody>
+      </p:sp>
+      <p:sp>
+        <p:nvSpPr>
+          <p:cNvPr id="91" name="Rectangle 8"/>
+          <p:cNvSpPr/>
+          <p:nvPr/>
+        </p:nvSpPr>
+        <p:spPr>
+          <a:xfrm>
+            <a:off x="6259835" y="1043985"/>
+            <a:ext cx="708186" cy="346760"/>
+          </a:xfrm>
+          <a:prstGeom prst="rect">
+            <a:avLst/>
+          </a:prstGeom>
+          <a:ln w="19050">
+            <a:solidFill>
+              <a:srgbClr val="7030A0"/>
+            </a:solidFill>
+          </a:ln>
+          <a:effectLst/>
+        </p:spPr>
+        <p:style>
+          <a:lnRef idx="1">
+            <a:schemeClr val="accent4"/>
+          </a:lnRef>
+          <a:fillRef idx="2">
+            <a:schemeClr val="accent4"/>
+          </a:fillRef>
+          <a:effectRef idx="1">
+            <a:schemeClr val="accent4"/>
+          </a:effectRef>
+          <a:fontRef idx="minor">
+            <a:schemeClr val="dk1"/>
+          </a:fontRef>
+        </p:style>
+        <p:txBody>
+          <a:bodyPr rtlCol="0" anchor="ctr"/>
+          <a:lstStyle/>
+          <a:p>
+            <a:pPr algn="ctr"/>
+            <a:r>
+              <a:rPr lang="en-SG" sz="1050" dirty="0" smtClean="0">
+                <a:solidFill>
+                  <a:srgbClr val="7030A0"/>
+                </a:solidFill>
+              </a:rPr>
+              <a:t>Event</a:t>
+            </a:r>
+            <a:endParaRPr lang="en-SG" sz="1050" dirty="0">
+              <a:solidFill>
+                <a:srgbClr val="7030A0"/>
+              </a:solidFill>
+            </a:endParaRPr>
+          </a:p>
+        </p:txBody>
+      </p:sp>
+      <p:sp>
+        <p:nvSpPr>
+          <p:cNvPr id="92" name="Flowchart: Decision 96"/>
+          <p:cNvSpPr/>
+          <p:nvPr/>
+        </p:nvSpPr>
+        <p:spPr>
+          <a:xfrm>
+            <a:off x="6968021" y="1130675"/>
+            <a:ext cx="236048" cy="173380"/>
+          </a:xfrm>
+          <a:prstGeom prst="flowChartDecision">
+            <a:avLst/>
+          </a:prstGeom>
+          <a:solidFill>
+            <a:srgbClr val="7030A0"/>
+          </a:solidFill>
+          <a:ln w="19050">
+            <a:solidFill>
+              <a:srgbClr val="7030A0"/>
+            </a:solidFill>
+          </a:ln>
+          <a:effectLst/>
+        </p:spPr>
+        <p:style>
+          <a:lnRef idx="1">
+            <a:schemeClr val="accent6"/>
+          </a:lnRef>
+          <a:fillRef idx="2">
+            <a:schemeClr val="accent6"/>
+          </a:fillRef>
+          <a:effectRef idx="1">
+            <a:schemeClr val="accent6"/>
+          </a:effectRef>
+          <a:fontRef idx="minor">
+            <a:schemeClr val="dk1"/>
+          </a:fontRef>
+        </p:style>
+        <p:txBody>
+          <a:bodyPr rtlCol="0" anchor="ctr"/>
+          <a:lstStyle/>
+          <a:p>
+            <a:pPr algn="ctr"/>
+            <a:endParaRPr lang="en-US" sz="1050"/>
+          </a:p>
+        </p:txBody>
+      </p:sp>
+      <p:sp>
+        <p:nvSpPr>
+          <p:cNvPr id="93" name="Rectangle 8"/>
+          <p:cNvSpPr/>
+          <p:nvPr/>
+        </p:nvSpPr>
+        <p:spPr>
+          <a:xfrm>
+            <a:off x="7603791" y="853322"/>
+            <a:ext cx="708186" cy="285783"/>
+          </a:xfrm>
+          <a:prstGeom prst="rect">
+            <a:avLst/>
+          </a:prstGeom>
+          <a:ln w="19050">
+            <a:solidFill>
+              <a:srgbClr val="7030A0"/>
+            </a:solidFill>
+          </a:ln>
+          <a:effectLst/>
+        </p:spPr>
+        <p:style>
+          <a:lnRef idx="1">
+            <a:schemeClr val="accent4"/>
+          </a:lnRef>
+          <a:fillRef idx="2">
+            <a:schemeClr val="accent4"/>
+          </a:fillRef>
+          <a:effectRef idx="1">
+            <a:schemeClr val="accent4"/>
+          </a:effectRef>
+          <a:fontRef idx="minor">
+            <a:schemeClr val="dk1"/>
+          </a:fontRef>
+        </p:style>
+        <p:txBody>
+          <a:bodyPr rtlCol="0" anchor="ctr"/>
+          <a:lstStyle/>
+          <a:p>
+            <a:pPr algn="ctr"/>
+            <a:r>
+              <a:rPr lang="en-US" sz="1050" dirty="0" smtClean="0">
+                <a:solidFill>
+                  <a:srgbClr val="7030A0"/>
+                </a:solidFill>
+              </a:rPr>
+              <a:t>Name</a:t>
+            </a:r>
+            <a:endParaRPr lang="en-SG" sz="1050" dirty="0">
+              <a:solidFill>
+                <a:srgbClr val="7030A0"/>
+              </a:solidFill>
+            </a:endParaRPr>
+          </a:p>
+        </p:txBody>
+      </p:sp>
+      <p:sp>
+        <p:nvSpPr>
+          <p:cNvPr id="94" name="Rectangle 8"/>
+          <p:cNvSpPr/>
+          <p:nvPr/>
+        </p:nvSpPr>
+        <p:spPr>
+          <a:xfrm>
+            <a:off x="7603791" y="1192255"/>
+            <a:ext cx="708186" cy="285783"/>
+          </a:xfrm>
+          <a:prstGeom prst="rect">
+            <a:avLst/>
+          </a:prstGeom>
+          <a:ln w="19050">
+            <a:solidFill>
+              <a:srgbClr val="7030A0"/>
+            </a:solidFill>
+          </a:ln>
+          <a:effectLst/>
+        </p:spPr>
+        <p:style>
+          <a:lnRef idx="1">
+            <a:schemeClr val="accent4"/>
+          </a:lnRef>
+          <a:fillRef idx="2">
+            <a:schemeClr val="accent4"/>
+          </a:fillRef>
+          <a:effectRef idx="1">
+            <a:schemeClr val="accent4"/>
+          </a:effectRef>
+          <a:fontRef idx="minor">
+            <a:schemeClr val="dk1"/>
+          </a:fontRef>
+        </p:style>
+        <p:txBody>
+          <a:bodyPr rtlCol="0" anchor="ctr"/>
+          <a:lstStyle/>
+          <a:p>
+            <a:pPr algn="ctr"/>
+            <a:r>
+              <a:rPr lang="en-SG" sz="1050" dirty="0" smtClean="0">
+                <a:solidFill>
+                  <a:srgbClr val="7030A0"/>
+                </a:solidFill>
+              </a:rPr>
+              <a:t>Dates</a:t>
+            </a:r>
+            <a:endParaRPr lang="en-SG" sz="1050" dirty="0">
+              <a:solidFill>
+                <a:srgbClr val="7030A0"/>
+              </a:solidFill>
+            </a:endParaRPr>
+          </a:p>
+        </p:txBody>
+      </p:sp>
+      <p:sp>
+        <p:nvSpPr>
+          <p:cNvPr id="95" name="Rectangle 8"/>
+          <p:cNvSpPr/>
+          <p:nvPr/>
+        </p:nvSpPr>
+        <p:spPr>
+          <a:xfrm>
+            <a:off x="7603791" y="1512929"/>
+            <a:ext cx="816792" cy="285783"/>
+          </a:xfrm>
+          <a:prstGeom prst="rect">
+            <a:avLst/>
+          </a:prstGeom>
+          <a:ln w="19050">
+            <a:solidFill>
+              <a:srgbClr val="7030A0"/>
+            </a:solidFill>
+          </a:ln>
+          <a:effectLst/>
+        </p:spPr>
+        <p:style>
+          <a:lnRef idx="1">
+            <a:schemeClr val="accent4"/>
+          </a:lnRef>
+          <a:fillRef idx="2">
+            <a:schemeClr val="accent4"/>
+          </a:fillRef>
+          <a:effectRef idx="1">
+            <a:schemeClr val="accent4"/>
+          </a:effectRef>
+          <a:fontRef idx="minor">
+            <a:schemeClr val="dk1"/>
+          </a:fontRef>
+        </p:style>
+        <p:txBody>
+          <a:bodyPr rtlCol="0" anchor="ctr"/>
+          <a:lstStyle/>
+          <a:p>
+            <a:pPr algn="ctr"/>
+            <a:r>
+              <a:rPr lang="en-SG" sz="1050" dirty="0" smtClean="0">
+                <a:solidFill>
+                  <a:srgbClr val="7030A0"/>
+                </a:solidFill>
+              </a:rPr>
+              <a:t>Description</a:t>
+            </a:r>
+            <a:endParaRPr lang="en-SG" sz="1050" dirty="0">
+              <a:solidFill>
+                <a:srgbClr val="7030A0"/>
+              </a:solidFill>
+            </a:endParaRPr>
+          </a:p>
+        </p:txBody>
+      </p:sp>
+      <p:cxnSp>
+        <p:nvCxnSpPr>
+          <p:cNvPr id="28" name="Elbow Connector 27"/>
+          <p:cNvCxnSpPr>
+            <a:endCxn id="93" idx="1"/>
+          </p:cNvCxnSpPr>
+          <p:nvPr/>
+        </p:nvCxnSpPr>
+        <p:spPr>
+          <a:xfrm flipV="1">
+            <a:off x="7204069" y="996214"/>
+            <a:ext cx="399722" cy="208444"/>
+          </a:xfrm>
+          <a:prstGeom prst="bentConnector3">
+            <a:avLst/>
+          </a:prstGeom>
+          <a:ln w="19050">
+            <a:solidFill>
+              <a:srgbClr val="7030A0"/>
+            </a:solidFill>
+            <a:tailEnd type="triangle"/>
+          </a:ln>
+        </p:spPr>
+        <p:style>
+          <a:lnRef idx="1">
+            <a:schemeClr val="accent1"/>
+          </a:lnRef>
+          <a:fillRef idx="0">
+            <a:schemeClr val="accent1"/>
+          </a:fillRef>
+          <a:effectRef idx="0">
+            <a:schemeClr val="accent1"/>
+          </a:effectRef>
+          <a:fontRef idx="minor">
+            <a:schemeClr val="tx1"/>
+          </a:fontRef>
+        </p:style>
+      </p:cxnSp>
+      <p:cxnSp>
+        <p:nvCxnSpPr>
+          <p:cNvPr id="31" name="Elbow Connector 30"/>
+          <p:cNvCxnSpPr>
+            <a:stCxn id="92" idx="3"/>
+            <a:endCxn id="94" idx="1"/>
+          </p:cNvCxnSpPr>
+          <p:nvPr/>
+        </p:nvCxnSpPr>
+        <p:spPr>
+          <a:xfrm>
+            <a:off x="7204069" y="1217365"/>
+            <a:ext cx="399722" cy="117782"/>
+          </a:xfrm>
+          <a:prstGeom prst="bentConnector3">
+            <a:avLst/>
+          </a:prstGeom>
+          <a:ln w="19050">
+            <a:solidFill>
+              <a:srgbClr val="7030A0"/>
+            </a:solidFill>
+            <a:tailEnd type="triangle"/>
+          </a:ln>
+        </p:spPr>
+        <p:style>
+          <a:lnRef idx="1">
+            <a:schemeClr val="accent1"/>
+          </a:lnRef>
+          <a:fillRef idx="0">
+            <a:schemeClr val="accent1"/>
+          </a:fillRef>
+          <a:effectRef idx="0">
+            <a:schemeClr val="accent1"/>
+          </a:effectRef>
+          <a:fontRef idx="minor">
+            <a:schemeClr val="tx1"/>
+          </a:fontRef>
+        </p:style>
+      </p:cxnSp>
+      <p:cxnSp>
+        <p:nvCxnSpPr>
+          <p:cNvPr id="35" name="Straight Connector 34"/>
+          <p:cNvCxnSpPr/>
+          <p:nvPr/>
+        </p:nvCxnSpPr>
+        <p:spPr>
+          <a:xfrm>
+            <a:off x="7403930" y="1276256"/>
+            <a:ext cx="0" cy="379564"/>
+          </a:xfrm>
+          <a:prstGeom prst="line">
+            <a:avLst/>
+          </a:prstGeom>
+          <a:ln w="19050">
+            <a:solidFill>
+              <a:srgbClr val="7030A0"/>
+            </a:solidFill>
+          </a:ln>
+        </p:spPr>
+        <p:style>
+          <a:lnRef idx="1">
+            <a:schemeClr val="accent1"/>
+          </a:lnRef>
+          <a:fillRef idx="0">
+            <a:schemeClr val="accent1"/>
+          </a:fillRef>
+          <a:effectRef idx="0">
+            <a:schemeClr val="accent1"/>
+          </a:effectRef>
+          <a:fontRef idx="minor">
+            <a:schemeClr val="tx1"/>
+          </a:fontRef>
+        </p:style>
+      </p:cxnSp>
+      <p:cxnSp>
+        <p:nvCxnSpPr>
+          <p:cNvPr id="96" name="Straight Arrow Connector 95"/>
+          <p:cNvCxnSpPr/>
+          <p:nvPr/>
+        </p:nvCxnSpPr>
+        <p:spPr>
+          <a:xfrm>
+            <a:off x="7390304" y="1655541"/>
+            <a:ext cx="217201" cy="1906"/>
+          </a:xfrm>
+          <a:prstGeom prst="straightConnector1">
+            <a:avLst/>
+          </a:prstGeom>
+          <a:ln w="19050">
+            <a:solidFill>
+              <a:srgbClr val="7030A0"/>
+            </a:solidFill>
+            <a:tailEnd type="triangle"/>
+          </a:ln>
+        </p:spPr>
+        <p:style>
+          <a:lnRef idx="1">
+            <a:schemeClr val="accent1"/>
+          </a:lnRef>
+          <a:fillRef idx="0">
+            <a:schemeClr val="accent1"/>
+          </a:fillRef>
+          <a:effectRef idx="0">
+            <a:schemeClr val="accent1"/>
+          </a:effectRef>
+          <a:fontRef idx="minor">
+            <a:schemeClr val="tx1"/>
+          </a:fontRef>
+        </p:style>
+      </p:cxnSp>
+      <p:sp>
+        <p:nvSpPr>
+          <p:cNvPr id="98" name="Flowchart: Decision 96"/>
+          <p:cNvSpPr/>
+          <p:nvPr/>
+        </p:nvSpPr>
+        <p:spPr>
+          <a:xfrm>
+            <a:off x="5586523" y="1139105"/>
+            <a:ext cx="236048" cy="173380"/>
+          </a:xfrm>
+          <a:prstGeom prst="flowChartDecision">
+            <a:avLst/>
+          </a:prstGeom>
+          <a:noFill/>
+          <a:ln w="19050">
+            <a:solidFill>
+              <a:srgbClr val="7030A0"/>
+            </a:solidFill>
+          </a:ln>
+          <a:effectLst/>
+        </p:spPr>
+        <p:style>
+          <a:lnRef idx="1">
+            <a:schemeClr val="accent6"/>
+          </a:lnRef>
+          <a:fillRef idx="2">
+            <a:schemeClr val="accent6"/>
+          </a:fillRef>
+          <a:effectRef idx="1">
+            <a:schemeClr val="accent6"/>
+          </a:effectRef>
+          <a:fontRef idx="minor">
+            <a:schemeClr val="dk1"/>
+          </a:fontRef>
+        </p:style>
+        <p:txBody>
+          <a:bodyPr rtlCol="0" anchor="ctr"/>
+          <a:lstStyle/>
+          <a:p>
+            <a:pPr algn="ctr"/>
+            <a:endParaRPr lang="en-US" sz="1050"/>
+          </a:p>
+        </p:txBody>
+      </p:sp>
+      <p:cxnSp>
+        <p:nvCxnSpPr>
+          <p:cNvPr id="101" name="Elbow Connector 100"/>
+          <p:cNvCxnSpPr/>
+          <p:nvPr/>
+        </p:nvCxnSpPr>
+        <p:spPr>
+          <a:xfrm>
+            <a:off x="5822571" y="1229942"/>
+            <a:ext cx="434402" cy="777"/>
+          </a:xfrm>
+          <a:prstGeom prst="bentConnector3">
+            <a:avLst/>
+          </a:prstGeom>
+          <a:ln w="19050">
+            <a:solidFill>
+              <a:srgbClr val="7030A0"/>
+            </a:solidFill>
+            <a:headEnd type="none" w="med" len="med"/>
+            <a:tailEnd type="arrow" w="med" len="med"/>
+          </a:ln>
+          <a:effectLst/>
+        </p:spPr>
+        <p:style>
+          <a:lnRef idx="1">
+            <a:schemeClr val="accent2"/>
+          </a:lnRef>
+          <a:fillRef idx="2">
+            <a:schemeClr val="accent2"/>
+          </a:fillRef>
+          <a:effectRef idx="1">
+            <a:schemeClr val="accent2"/>
+          </a:effectRef>
+          <a:fontRef idx="minor">
+            <a:schemeClr val="dk1"/>
+          </a:fontRef>
+        </p:style>
+      </p:cxnSp>
+      <p:sp>
+        <p:nvSpPr>
+          <p:cNvPr id="102" name="TextBox 101"/>
+          <p:cNvSpPr txBox="1"/>
+          <p:nvPr/>
+        </p:nvSpPr>
+        <p:spPr>
+          <a:xfrm>
+            <a:off x="6033036" y="1292707"/>
+            <a:ext cx="189257" cy="178683"/>
+          </a:xfrm>
+          <a:prstGeom prst="rect">
+            <a:avLst/>
+          </a:prstGeom>
+          <a:noFill/>
+        </p:spPr>
+        <p:txBody>
+          <a:bodyPr wrap="square" lIns="0" tIns="0" rIns="0" bIns="0" rtlCol="0">
+            <a:noAutofit/>
+          </a:bodyPr>
+          <a:lstStyle/>
+          <a:p>
+            <a:pPr algn="ctr"/>
+            <a:r>
+              <a:rPr lang="en-US" sz="1100" dirty="0" smtClean="0">
+                <a:solidFill>
+                  <a:srgbClr val="7030A0"/>
+                </a:solidFill>
+              </a:rPr>
+              <a:t>*</a:t>
+            </a:r>
+            <a:endParaRPr lang="en-SG" sz="1100" dirty="0">
+              <a:solidFill>
+                <a:srgbClr val="7030A0"/>
+              </a:solidFill>
+            </a:endParaRPr>
+          </a:p>
+        </p:txBody>
+      </p:sp>
+      <p:cxnSp>
+        <p:nvCxnSpPr>
+          <p:cNvPr id="103" name="Straight Connector 102"/>
+          <p:cNvCxnSpPr/>
+          <p:nvPr/>
+        </p:nvCxnSpPr>
+        <p:spPr>
+          <a:xfrm>
+            <a:off x="4335482" y="1225795"/>
+            <a:ext cx="13357" cy="1293085"/>
+          </a:xfrm>
+          <a:prstGeom prst="line">
+            <a:avLst/>
+          </a:prstGeom>
+          <a:ln w="19050">
+            <a:solidFill>
+              <a:srgbClr val="7030A0"/>
+            </a:solidFill>
+          </a:ln>
+        </p:spPr>
+        <p:style>
+          <a:lnRef idx="1">
+            <a:schemeClr val="accent1"/>
+          </a:lnRef>
+          <a:fillRef idx="0">
+            <a:schemeClr val="accent1"/>
+          </a:fillRef>
+          <a:effectRef idx="0">
+            <a:schemeClr val="accent1"/>
+          </a:effectRef>
+          <a:fontRef idx="minor">
+            <a:schemeClr val="tx1"/>
+          </a:fontRef>
+        </p:style>
+      </p:cxnSp>
+      <p:cxnSp>
+        <p:nvCxnSpPr>
+          <p:cNvPr id="109" name="Straight Arrow Connector 108"/>
+          <p:cNvCxnSpPr/>
+          <p:nvPr/>
+        </p:nvCxnSpPr>
+        <p:spPr>
+          <a:xfrm>
+            <a:off x="4335482" y="1225795"/>
+            <a:ext cx="138658" cy="15419"/>
+          </a:xfrm>
+          <a:prstGeom prst="straightConnector1">
+            <a:avLst/>
+          </a:prstGeom>
+          <a:ln w="19050">
+            <a:solidFill>
+              <a:srgbClr val="7030A0"/>
+            </a:solidFill>
+            <a:tailEnd type="triangle"/>
+          </a:ln>
+        </p:spPr>
+        <p:style>
+          <a:lnRef idx="1">
+            <a:schemeClr val="accent1"/>
+          </a:lnRef>
+          <a:fillRef idx="0">
+            <a:schemeClr val="accent1"/>
+          </a:fillRef>
+          <a:effectRef idx="0">
+            <a:schemeClr val="accent1"/>
+          </a:effectRef>
+          <a:fontRef idx="minor">
+            <a:schemeClr val="tx1"/>
+          </a:fontRef>
+        </p:style>
+      </p:cxnSp>
+      <p:sp>
+        <p:nvSpPr>
+          <p:cNvPr id="110" name="TextBox 109"/>
+          <p:cNvSpPr txBox="1"/>
+          <p:nvPr/>
+        </p:nvSpPr>
+        <p:spPr>
+          <a:xfrm>
+            <a:off x="4161013" y="1125372"/>
+            <a:ext cx="189257" cy="178683"/>
+          </a:xfrm>
+          <a:prstGeom prst="rect">
+            <a:avLst/>
+          </a:prstGeom>
+          <a:noFill/>
+        </p:spPr>
+        <p:txBody>
+          <a:bodyPr wrap="square" lIns="0" tIns="0" rIns="0" bIns="0" rtlCol="0">
+            <a:noAutofit/>
+          </a:bodyPr>
+          <a:lstStyle/>
+          <a:p>
+            <a:pPr algn="ctr"/>
+            <a:r>
+              <a:rPr lang="en-US" sz="1100" dirty="0" smtClean="0">
+                <a:solidFill>
+                  <a:srgbClr val="7030A0"/>
+                </a:solidFill>
+              </a:rPr>
+              <a:t>1</a:t>
+            </a:r>
+            <a:endParaRPr lang="en-SG" sz="1100" dirty="0">
+              <a:solidFill>
+                <a:srgbClr val="7030A0"/>
+              </a:solidFill>
+            </a:endParaRPr>
+          </a:p>
+        </p:txBody>
+      </p:sp>
+      <p:sp>
+        <p:nvSpPr>
+          <p:cNvPr id="111" name="Rectangle 8"/>
+          <p:cNvSpPr/>
+          <p:nvPr/>
+        </p:nvSpPr>
+        <p:spPr>
+          <a:xfrm>
+            <a:off x="6334748" y="4765727"/>
+            <a:ext cx="708186" cy="346760"/>
+          </a:xfrm>
+          <a:prstGeom prst="rect">
+            <a:avLst/>
+          </a:prstGeom>
+          <a:ln w="19050">
+            <a:solidFill>
+              <a:srgbClr val="7030A0"/>
+            </a:solidFill>
+          </a:ln>
+          <a:effectLst/>
+        </p:spPr>
+        <p:style>
+          <a:lnRef idx="1">
+            <a:schemeClr val="accent4"/>
+          </a:lnRef>
+          <a:fillRef idx="2">
+            <a:schemeClr val="accent4"/>
+          </a:fillRef>
+          <a:effectRef idx="1">
+            <a:schemeClr val="accent4"/>
+          </a:effectRef>
+          <a:fontRef idx="minor">
+            <a:schemeClr val="dk1"/>
+          </a:fontRef>
+        </p:style>
+        <p:txBody>
+          <a:bodyPr rtlCol="0" anchor="ctr"/>
+          <a:lstStyle/>
+          <a:p>
+            <a:pPr algn="ctr"/>
+            <a:r>
+              <a:rPr lang="en-SG" sz="1050" dirty="0" smtClean="0">
+                <a:solidFill>
+                  <a:srgbClr val="7030A0"/>
+                </a:solidFill>
+              </a:rPr>
+              <a:t>Group</a:t>
+            </a:r>
+            <a:endParaRPr lang="en-SG" sz="1050" dirty="0">
+              <a:solidFill>
+                <a:srgbClr val="7030A0"/>
+              </a:solidFill>
+            </a:endParaRPr>
+          </a:p>
+        </p:txBody>
+      </p:sp>
+      <p:cxnSp>
+        <p:nvCxnSpPr>
+          <p:cNvPr id="112" name="Elbow Connector 111"/>
+          <p:cNvCxnSpPr/>
+          <p:nvPr/>
+        </p:nvCxnSpPr>
+        <p:spPr>
+          <a:xfrm>
+            <a:off x="5900346" y="4947684"/>
+            <a:ext cx="434402" cy="777"/>
+          </a:xfrm>
+          <a:prstGeom prst="bentConnector3">
+            <a:avLst/>
+          </a:prstGeom>
+          <a:ln w="19050">
+            <a:solidFill>
+              <a:srgbClr val="7030A0"/>
+            </a:solidFill>
+            <a:headEnd type="none" w="med" len="med"/>
+            <a:tailEnd type="arrow" w="med" len="med"/>
+          </a:ln>
+          <a:effectLst/>
+        </p:spPr>
+        <p:style>
+          <a:lnRef idx="1">
+            <a:schemeClr val="accent2"/>
+          </a:lnRef>
+          <a:fillRef idx="2">
+            <a:schemeClr val="accent2"/>
+          </a:fillRef>
+          <a:effectRef idx="1">
+            <a:schemeClr val="accent2"/>
+          </a:effectRef>
+          <a:fontRef idx="minor">
+            <a:schemeClr val="dk1"/>
+          </a:fontRef>
+        </p:style>
+      </p:cxnSp>
+      <p:sp>
+        <p:nvSpPr>
+          <p:cNvPr id="113" name="Flowchart: Decision 96"/>
+          <p:cNvSpPr/>
+          <p:nvPr/>
+        </p:nvSpPr>
+        <p:spPr>
+          <a:xfrm>
+            <a:off x="5666365" y="4852417"/>
+            <a:ext cx="236048" cy="173380"/>
+          </a:xfrm>
+          <a:prstGeom prst="flowChartDecision">
+            <a:avLst/>
+          </a:prstGeom>
+          <a:noFill/>
+          <a:ln w="19050">
+            <a:solidFill>
+              <a:srgbClr val="7030A0"/>
+            </a:solidFill>
+          </a:ln>
+          <a:effectLst/>
+        </p:spPr>
+        <p:style>
+          <a:lnRef idx="1">
+            <a:schemeClr val="accent6"/>
+          </a:lnRef>
+          <a:fillRef idx="2">
+            <a:schemeClr val="accent6"/>
+          </a:fillRef>
+          <a:effectRef idx="1">
+            <a:schemeClr val="accent6"/>
+          </a:effectRef>
+          <a:fontRef idx="minor">
+            <a:schemeClr val="dk1"/>
+          </a:fontRef>
+        </p:style>
+        <p:txBody>
+          <a:bodyPr rtlCol="0" anchor="ctr"/>
+          <a:lstStyle/>
+          <a:p>
+            <a:pPr algn="ctr"/>
+            <a:endParaRPr lang="en-US" sz="1050"/>
+          </a:p>
+        </p:txBody>
+      </p:sp>
+      <p:sp>
+        <p:nvSpPr>
+          <p:cNvPr id="115" name="Flowchart: Decision 96"/>
+          <p:cNvSpPr/>
+          <p:nvPr/>
+        </p:nvSpPr>
+        <p:spPr>
+          <a:xfrm>
+            <a:off x="7041947" y="4852417"/>
+            <a:ext cx="236048" cy="173380"/>
+          </a:xfrm>
+          <a:prstGeom prst="flowChartDecision">
+            <a:avLst/>
+          </a:prstGeom>
+          <a:solidFill>
+            <a:srgbClr val="7030A0"/>
+          </a:solidFill>
+          <a:ln w="19050">
+            <a:solidFill>
+              <a:srgbClr val="7030A0"/>
+            </a:solidFill>
+          </a:ln>
+          <a:effectLst/>
+        </p:spPr>
+        <p:style>
+          <a:lnRef idx="1">
+            <a:schemeClr val="accent6"/>
+          </a:lnRef>
+          <a:fillRef idx="2">
+            <a:schemeClr val="accent6"/>
+          </a:fillRef>
+          <a:effectRef idx="1">
+            <a:schemeClr val="accent6"/>
+          </a:effectRef>
+          <a:fontRef idx="minor">
+            <a:schemeClr val="dk1"/>
+          </a:fontRef>
+        </p:style>
+        <p:txBody>
+          <a:bodyPr rtlCol="0" anchor="ctr"/>
+          <a:lstStyle/>
+          <a:p>
+            <a:pPr algn="ctr"/>
+            <a:endParaRPr lang="en-US" sz="1050"/>
+          </a:p>
+        </p:txBody>
+      </p:sp>
+      <p:sp>
+        <p:nvSpPr>
+          <p:cNvPr id="116" name="Rectangle 8"/>
+          <p:cNvSpPr/>
+          <p:nvPr/>
+        </p:nvSpPr>
+        <p:spPr>
+          <a:xfrm>
+            <a:off x="7495195" y="4804211"/>
+            <a:ext cx="708186" cy="285783"/>
+          </a:xfrm>
+          <a:prstGeom prst="rect">
+            <a:avLst/>
+          </a:prstGeom>
+          <a:ln w="19050">
+            <a:solidFill>
+              <a:srgbClr val="7030A0"/>
+            </a:solidFill>
+          </a:ln>
+          <a:effectLst/>
+        </p:spPr>
+        <p:style>
+          <a:lnRef idx="1">
+            <a:schemeClr val="accent4"/>
+          </a:lnRef>
+          <a:fillRef idx="2">
+            <a:schemeClr val="accent4"/>
+          </a:fillRef>
+          <a:effectRef idx="1">
+            <a:schemeClr val="accent4"/>
+          </a:effectRef>
+          <a:fontRef idx="minor">
+            <a:schemeClr val="dk1"/>
+          </a:fontRef>
+        </p:style>
+        <p:txBody>
+          <a:bodyPr rtlCol="0" anchor="ctr"/>
+          <a:lstStyle/>
+          <a:p>
+            <a:pPr algn="ctr"/>
+            <a:r>
+              <a:rPr lang="en-US" sz="1050" dirty="0" smtClean="0">
+                <a:solidFill>
+                  <a:srgbClr val="7030A0"/>
+                </a:solidFill>
+              </a:rPr>
+              <a:t>Name</a:t>
+            </a:r>
+            <a:endParaRPr lang="en-SG" sz="1050" dirty="0">
+              <a:solidFill>
+                <a:srgbClr val="7030A0"/>
+              </a:solidFill>
+            </a:endParaRPr>
+          </a:p>
+        </p:txBody>
+      </p:sp>
+      <p:sp>
+        <p:nvSpPr>
+          <p:cNvPr id="117" name="Rectangle 8"/>
+          <p:cNvSpPr/>
+          <p:nvPr/>
+        </p:nvSpPr>
+        <p:spPr>
+          <a:xfrm>
+            <a:off x="4508316" y="4743815"/>
+            <a:ext cx="1156969" cy="346760"/>
+          </a:xfrm>
+          <a:prstGeom prst="rect">
+            <a:avLst/>
+          </a:prstGeom>
+          <a:ln w="19050">
+            <a:solidFill>
+              <a:srgbClr val="7030A0"/>
+            </a:solidFill>
+          </a:ln>
+          <a:effectLst/>
+        </p:spPr>
+        <p:style>
+          <a:lnRef idx="1">
+            <a:schemeClr val="accent4"/>
+          </a:lnRef>
+          <a:fillRef idx="2">
+            <a:schemeClr val="accent4"/>
+          </a:fillRef>
+          <a:effectRef idx="1">
+            <a:schemeClr val="accent4"/>
+          </a:effectRef>
+          <a:fontRef idx="minor">
+            <a:schemeClr val="dk1"/>
+          </a:fontRef>
+        </p:style>
+        <p:txBody>
+          <a:bodyPr rtlCol="0" anchor="ctr"/>
+          <a:lstStyle/>
+          <a:p>
+            <a:pPr algn="ctr"/>
+            <a:r>
+              <a:rPr lang="en-US" sz="1050" dirty="0" err="1" smtClean="0">
+                <a:solidFill>
+                  <a:srgbClr val="7030A0"/>
+                </a:solidFill>
+              </a:rPr>
+              <a:t>UniqueGroupList</a:t>
+            </a:r>
+            <a:endParaRPr lang="en-SG" sz="1050" dirty="0">
+              <a:solidFill>
+                <a:srgbClr val="7030A0"/>
+              </a:solidFill>
+            </a:endParaRPr>
+          </a:p>
+        </p:txBody>
+      </p:sp>
+      <p:cxnSp>
+        <p:nvCxnSpPr>
+          <p:cNvPr id="121" name="Straight Arrow Connector 120"/>
+          <p:cNvCxnSpPr/>
+          <p:nvPr/>
+        </p:nvCxnSpPr>
+        <p:spPr>
+          <a:xfrm>
+            <a:off x="7277995" y="4937201"/>
+            <a:ext cx="217201" cy="1906"/>
+          </a:xfrm>
+          <a:prstGeom prst="straightConnector1">
+            <a:avLst/>
+          </a:prstGeom>
+          <a:ln w="19050">
+            <a:solidFill>
+              <a:srgbClr val="7030A0"/>
+            </a:solidFill>
+            <a:tailEnd type="triangle"/>
+          </a:ln>
+        </p:spPr>
+        <p:style>
+          <a:lnRef idx="1">
+            <a:schemeClr val="accent1"/>
+          </a:lnRef>
+          <a:fillRef idx="0">
+            <a:schemeClr val="accent1"/>
+          </a:fillRef>
+          <a:effectRef idx="0">
+            <a:schemeClr val="accent1"/>
+          </a:effectRef>
+          <a:fontRef idx="minor">
+            <a:schemeClr val="tx1"/>
+          </a:fontRef>
+        </p:style>
+      </p:cxnSp>
+      <p:cxnSp>
+        <p:nvCxnSpPr>
+          <p:cNvPr id="126" name="Elbow Connector 125"/>
+          <p:cNvCxnSpPr/>
+          <p:nvPr/>
+        </p:nvCxnSpPr>
+        <p:spPr>
+          <a:xfrm rot="5400000">
+            <a:off x="5477748" y="3572860"/>
+            <a:ext cx="1232027" cy="1127528"/>
+          </a:xfrm>
+          <a:prstGeom prst="bentConnector3">
+            <a:avLst/>
+          </a:prstGeom>
+          <a:ln w="19050">
+            <a:solidFill>
+              <a:srgbClr val="7030A0"/>
+            </a:solidFill>
+            <a:tailEnd type="triangle"/>
+          </a:ln>
+        </p:spPr>
+        <p:style>
+          <a:lnRef idx="1">
+            <a:schemeClr val="accent1"/>
+          </a:lnRef>
+          <a:fillRef idx="0">
+            <a:schemeClr val="accent1"/>
+          </a:fillRef>
+          <a:effectRef idx="0">
+            <a:schemeClr val="accent1"/>
+          </a:effectRef>
+          <a:fontRef idx="minor">
+            <a:schemeClr val="tx1"/>
+          </a:fontRef>
+        </p:style>
+      </p:cxnSp>
+      <p:cxnSp>
+        <p:nvCxnSpPr>
+          <p:cNvPr id="129" name="Straight Connector 128"/>
+          <p:cNvCxnSpPr>
+            <a:endCxn id="62" idx="2"/>
+          </p:cNvCxnSpPr>
+          <p:nvPr/>
+        </p:nvCxnSpPr>
+        <p:spPr>
+          <a:xfrm flipV="1">
+            <a:off x="6657526" y="3204826"/>
+            <a:ext cx="10244" cy="317293"/>
+          </a:xfrm>
+          <a:prstGeom prst="line">
+            <a:avLst/>
+          </a:prstGeom>
+          <a:ln w="19050">
+            <a:solidFill>
+              <a:srgbClr val="7030A0"/>
+            </a:solidFill>
+          </a:ln>
+        </p:spPr>
+        <p:style>
+          <a:lnRef idx="1">
+            <a:schemeClr val="accent1"/>
+          </a:lnRef>
+          <a:fillRef idx="0">
+            <a:schemeClr val="accent1"/>
+          </a:fillRef>
+          <a:effectRef idx="0">
+            <a:schemeClr val="accent1"/>
+          </a:effectRef>
+          <a:fontRef idx="minor">
+            <a:schemeClr val="tx1"/>
+          </a:fontRef>
+        </p:style>
+      </p:cxnSp>
+      <p:sp>
+        <p:nvSpPr>
+          <p:cNvPr id="130" name="TextBox 129"/>
+          <p:cNvSpPr txBox="1"/>
+          <p:nvPr/>
+        </p:nvSpPr>
+        <p:spPr>
+          <a:xfrm>
+            <a:off x="5330482" y="4542411"/>
+            <a:ext cx="189257" cy="178683"/>
+          </a:xfrm>
+          <a:prstGeom prst="rect">
+            <a:avLst/>
+          </a:prstGeom>
+          <a:noFill/>
+        </p:spPr>
+        <p:txBody>
+          <a:bodyPr wrap="square" lIns="0" tIns="0" rIns="0" bIns="0" rtlCol="0">
+            <a:noAutofit/>
+          </a:bodyPr>
+          <a:lstStyle/>
+          <a:p>
+            <a:pPr algn="ctr"/>
+            <a:r>
+              <a:rPr lang="en-US" sz="1100" dirty="0" smtClean="0">
+                <a:solidFill>
+                  <a:srgbClr val="7030A0"/>
+                </a:solidFill>
+              </a:rPr>
+              <a:t>1</a:t>
+            </a:r>
+            <a:endParaRPr lang="en-SG" sz="1100" dirty="0">
+              <a:solidFill>
+                <a:srgbClr val="7030A0"/>
+              </a:solidFill>
+            </a:endParaRPr>
+          </a:p>
+        </p:txBody>
+      </p:sp>
+      <p:cxnSp>
+        <p:nvCxnSpPr>
+          <p:cNvPr id="132" name="Straight Connector 131"/>
+          <p:cNvCxnSpPr/>
+          <p:nvPr/>
+        </p:nvCxnSpPr>
+        <p:spPr>
+          <a:xfrm>
+            <a:off x="4348839" y="2974180"/>
+            <a:ext cx="0" cy="1963021"/>
+          </a:xfrm>
+          <a:prstGeom prst="line">
+            <a:avLst/>
+          </a:prstGeom>
+          <a:ln w="19050">
+            <a:solidFill>
+              <a:srgbClr val="7030A0"/>
+            </a:solidFill>
+          </a:ln>
+        </p:spPr>
+        <p:style>
+          <a:lnRef idx="1">
+            <a:schemeClr val="accent1"/>
+          </a:lnRef>
+          <a:fillRef idx="0">
+            <a:schemeClr val="accent1"/>
+          </a:fillRef>
+          <a:effectRef idx="0">
+            <a:schemeClr val="accent1"/>
+          </a:effectRef>
+          <a:fontRef idx="minor">
+            <a:schemeClr val="tx1"/>
+          </a:fontRef>
+        </p:style>
+      </p:cxnSp>
+      <p:cxnSp>
+        <p:nvCxnSpPr>
+          <p:cNvPr id="133" name="Straight Arrow Connector 132"/>
+          <p:cNvCxnSpPr/>
+          <p:nvPr/>
+        </p:nvCxnSpPr>
+        <p:spPr>
+          <a:xfrm>
+            <a:off x="4342160" y="4932201"/>
+            <a:ext cx="217201" cy="1906"/>
+          </a:xfrm>
+          <a:prstGeom prst="straightConnector1">
+            <a:avLst/>
+          </a:prstGeom>
+          <a:ln w="19050">
+            <a:solidFill>
+              <a:srgbClr val="7030A0"/>
+            </a:solidFill>
+            <a:tailEnd type="triangle"/>
+          </a:ln>
+        </p:spPr>
+        <p:style>
+          <a:lnRef idx="1">
+            <a:schemeClr val="accent1"/>
+          </a:lnRef>
+          <a:fillRef idx="0">
+            <a:schemeClr val="accent1"/>
+          </a:fillRef>
+          <a:effectRef idx="0">
+            <a:schemeClr val="accent1"/>
+          </a:effectRef>
+          <a:fontRef idx="minor">
+            <a:schemeClr val="tx1"/>
+          </a:fontRef>
+        </p:style>
+      </p:cxnSp>
+      <p:sp>
+        <p:nvSpPr>
+          <p:cNvPr id="136" name="TextBox 135"/>
+          <p:cNvSpPr txBox="1"/>
+          <p:nvPr/>
+        </p:nvSpPr>
+        <p:spPr>
+          <a:xfrm>
+            <a:off x="4324972" y="4990126"/>
             <a:ext cx="189257" cy="178683"/>
           </a:xfrm>
           <a:prstGeom prst="rect">

</xml_diff>

<commit_message>
ug diagram re update
</commit_message>
<xml_diff>
--- a/docs/diagrams/ModelComponentClassDiagram.pptx
+++ b/docs/diagrams/ModelComponentClassDiagram.pptx
@@ -208,7 +208,7 @@
           <a:p>
             <a:fld id="{F5CC4B3F-88C1-4FFA-B1B6-F41C21DC6924}" type="datetimeFigureOut">
               <a:rPr lang="en-US" smtClean="0"/>
-              <a:t>11/11/2017</a:t>
+              <a:t>11/13/2017</a:t>
             </a:fld>
             <a:endParaRPr lang="en-US"/>
           </a:p>
@@ -657,7 +657,7 @@
           <a:p>
             <a:fld id="{78C97017-6FC3-485B-9764-EAC9E56C1D49}" type="datetimeFigureOut">
               <a:rPr lang="en-US" smtClean="0"/>
-              <a:t>11/11/2017</a:t>
+              <a:t>11/13/2017</a:t>
             </a:fld>
             <a:endParaRPr lang="en-US"/>
           </a:p>
@@ -827,7 +827,7 @@
           <a:p>
             <a:fld id="{78C97017-6FC3-485B-9764-EAC9E56C1D49}" type="datetimeFigureOut">
               <a:rPr lang="en-US" smtClean="0"/>
-              <a:t>11/11/2017</a:t>
+              <a:t>11/13/2017</a:t>
             </a:fld>
             <a:endParaRPr lang="en-US"/>
           </a:p>
@@ -1007,7 +1007,7 @@
           <a:p>
             <a:fld id="{78C97017-6FC3-485B-9764-EAC9E56C1D49}" type="datetimeFigureOut">
               <a:rPr lang="en-US" smtClean="0"/>
-              <a:t>11/11/2017</a:t>
+              <a:t>11/13/2017</a:t>
             </a:fld>
             <a:endParaRPr lang="en-US"/>
           </a:p>
@@ -1177,7 +1177,7 @@
           <a:p>
             <a:fld id="{78C97017-6FC3-485B-9764-EAC9E56C1D49}" type="datetimeFigureOut">
               <a:rPr lang="en-US" smtClean="0"/>
-              <a:t>11/11/2017</a:t>
+              <a:t>11/13/2017</a:t>
             </a:fld>
             <a:endParaRPr lang="en-US"/>
           </a:p>
@@ -1423,7 +1423,7 @@
           <a:p>
             <a:fld id="{78C97017-6FC3-485B-9764-EAC9E56C1D49}" type="datetimeFigureOut">
               <a:rPr lang="en-US" smtClean="0"/>
-              <a:t>11/11/2017</a:t>
+              <a:t>11/13/2017</a:t>
             </a:fld>
             <a:endParaRPr lang="en-US"/>
           </a:p>
@@ -1711,7 +1711,7 @@
           <a:p>
             <a:fld id="{78C97017-6FC3-485B-9764-EAC9E56C1D49}" type="datetimeFigureOut">
               <a:rPr lang="en-US" smtClean="0"/>
-              <a:t>11/11/2017</a:t>
+              <a:t>11/13/2017</a:t>
             </a:fld>
             <a:endParaRPr lang="en-US"/>
           </a:p>
@@ -2133,7 +2133,7 @@
           <a:p>
             <a:fld id="{78C97017-6FC3-485B-9764-EAC9E56C1D49}" type="datetimeFigureOut">
               <a:rPr lang="en-US" smtClean="0"/>
-              <a:t>11/11/2017</a:t>
+              <a:t>11/13/2017</a:t>
             </a:fld>
             <a:endParaRPr lang="en-US"/>
           </a:p>
@@ -2251,7 +2251,7 @@
           <a:p>
             <a:fld id="{78C97017-6FC3-485B-9764-EAC9E56C1D49}" type="datetimeFigureOut">
               <a:rPr lang="en-US" smtClean="0"/>
-              <a:t>11/11/2017</a:t>
+              <a:t>11/13/2017</a:t>
             </a:fld>
             <a:endParaRPr lang="en-US"/>
           </a:p>
@@ -2346,7 +2346,7 @@
           <a:p>
             <a:fld id="{78C97017-6FC3-485B-9764-EAC9E56C1D49}" type="datetimeFigureOut">
               <a:rPr lang="en-US" smtClean="0"/>
-              <a:t>11/11/2017</a:t>
+              <a:t>11/13/2017</a:t>
             </a:fld>
             <a:endParaRPr lang="en-US"/>
           </a:p>
@@ -2623,7 +2623,7 @@
           <a:p>
             <a:fld id="{78C97017-6FC3-485B-9764-EAC9E56C1D49}" type="datetimeFigureOut">
               <a:rPr lang="en-US" smtClean="0"/>
-              <a:t>11/11/2017</a:t>
+              <a:t>11/13/2017</a:t>
             </a:fld>
             <a:endParaRPr lang="en-US"/>
           </a:p>
@@ -2876,7 +2876,7 @@
           <a:p>
             <a:fld id="{78C97017-6FC3-485B-9764-EAC9E56C1D49}" type="datetimeFigureOut">
               <a:rPr lang="en-US" smtClean="0"/>
-              <a:t>11/11/2017</a:t>
+              <a:t>11/13/2017</a:t>
             </a:fld>
             <a:endParaRPr lang="en-US"/>
           </a:p>
@@ -3089,7 +3089,7 @@
           <a:p>
             <a:fld id="{78C97017-6FC3-485B-9764-EAC9E56C1D49}" type="datetimeFigureOut">
               <a:rPr lang="en-US" smtClean="0"/>
-              <a:t>11/11/2017</a:t>
+              <a:t>11/13/2017</a:t>
             </a:fld>
             <a:endParaRPr lang="en-US"/>
           </a:p>
@@ -6811,562 +6811,6 @@
         <p:spPr>
           <a:xfrm>
             <a:off x="4161013" y="1125372"/>
-            <a:ext cx="189257" cy="178683"/>
-          </a:xfrm>
-          <a:prstGeom prst="rect">
-            <a:avLst/>
-          </a:prstGeom>
-          <a:noFill/>
-        </p:spPr>
-        <p:txBody>
-          <a:bodyPr wrap="square" lIns="0" tIns="0" rIns="0" bIns="0" rtlCol="0">
-            <a:noAutofit/>
-          </a:bodyPr>
-          <a:lstStyle/>
-          <a:p>
-            <a:pPr algn="ctr"/>
-            <a:r>
-              <a:rPr lang="en-US" sz="1100" dirty="0" smtClean="0">
-                <a:solidFill>
-                  <a:srgbClr val="7030A0"/>
-                </a:solidFill>
-              </a:rPr>
-              <a:t>1</a:t>
-            </a:r>
-            <a:endParaRPr lang="en-SG" sz="1100" dirty="0">
-              <a:solidFill>
-                <a:srgbClr val="7030A0"/>
-              </a:solidFill>
-            </a:endParaRPr>
-          </a:p>
-        </p:txBody>
-      </p:sp>
-      <p:sp>
-        <p:nvSpPr>
-          <p:cNvPr id="111" name="Rectangle 8"/>
-          <p:cNvSpPr/>
-          <p:nvPr/>
-        </p:nvSpPr>
-        <p:spPr>
-          <a:xfrm>
-            <a:off x="6334748" y="4765727"/>
-            <a:ext cx="708186" cy="346760"/>
-          </a:xfrm>
-          <a:prstGeom prst="rect">
-            <a:avLst/>
-          </a:prstGeom>
-          <a:ln w="19050">
-            <a:solidFill>
-              <a:srgbClr val="7030A0"/>
-            </a:solidFill>
-          </a:ln>
-          <a:effectLst/>
-        </p:spPr>
-        <p:style>
-          <a:lnRef idx="1">
-            <a:schemeClr val="accent4"/>
-          </a:lnRef>
-          <a:fillRef idx="2">
-            <a:schemeClr val="accent4"/>
-          </a:fillRef>
-          <a:effectRef idx="1">
-            <a:schemeClr val="accent4"/>
-          </a:effectRef>
-          <a:fontRef idx="minor">
-            <a:schemeClr val="dk1"/>
-          </a:fontRef>
-        </p:style>
-        <p:txBody>
-          <a:bodyPr rtlCol="0" anchor="ctr"/>
-          <a:lstStyle/>
-          <a:p>
-            <a:pPr algn="ctr"/>
-            <a:r>
-              <a:rPr lang="en-SG" sz="1050" dirty="0" smtClean="0">
-                <a:solidFill>
-                  <a:srgbClr val="7030A0"/>
-                </a:solidFill>
-              </a:rPr>
-              <a:t>Group</a:t>
-            </a:r>
-            <a:endParaRPr lang="en-SG" sz="1050" dirty="0">
-              <a:solidFill>
-                <a:srgbClr val="7030A0"/>
-              </a:solidFill>
-            </a:endParaRPr>
-          </a:p>
-        </p:txBody>
-      </p:sp>
-      <p:cxnSp>
-        <p:nvCxnSpPr>
-          <p:cNvPr id="112" name="Elbow Connector 111"/>
-          <p:cNvCxnSpPr/>
-          <p:nvPr/>
-        </p:nvCxnSpPr>
-        <p:spPr>
-          <a:xfrm>
-            <a:off x="5900346" y="4947684"/>
-            <a:ext cx="434402" cy="777"/>
-          </a:xfrm>
-          <a:prstGeom prst="bentConnector3">
-            <a:avLst/>
-          </a:prstGeom>
-          <a:ln w="19050">
-            <a:solidFill>
-              <a:srgbClr val="7030A0"/>
-            </a:solidFill>
-            <a:headEnd type="none" w="med" len="med"/>
-            <a:tailEnd type="arrow" w="med" len="med"/>
-          </a:ln>
-          <a:effectLst/>
-        </p:spPr>
-        <p:style>
-          <a:lnRef idx="1">
-            <a:schemeClr val="accent2"/>
-          </a:lnRef>
-          <a:fillRef idx="2">
-            <a:schemeClr val="accent2"/>
-          </a:fillRef>
-          <a:effectRef idx="1">
-            <a:schemeClr val="accent2"/>
-          </a:effectRef>
-          <a:fontRef idx="minor">
-            <a:schemeClr val="dk1"/>
-          </a:fontRef>
-        </p:style>
-      </p:cxnSp>
-      <p:sp>
-        <p:nvSpPr>
-          <p:cNvPr id="113" name="Flowchart: Decision 96"/>
-          <p:cNvSpPr/>
-          <p:nvPr/>
-        </p:nvSpPr>
-        <p:spPr>
-          <a:xfrm>
-            <a:off x="5666365" y="4852417"/>
-            <a:ext cx="236048" cy="173380"/>
-          </a:xfrm>
-          <a:prstGeom prst="flowChartDecision">
-            <a:avLst/>
-          </a:prstGeom>
-          <a:noFill/>
-          <a:ln w="19050">
-            <a:solidFill>
-              <a:srgbClr val="7030A0"/>
-            </a:solidFill>
-          </a:ln>
-          <a:effectLst/>
-        </p:spPr>
-        <p:style>
-          <a:lnRef idx="1">
-            <a:schemeClr val="accent6"/>
-          </a:lnRef>
-          <a:fillRef idx="2">
-            <a:schemeClr val="accent6"/>
-          </a:fillRef>
-          <a:effectRef idx="1">
-            <a:schemeClr val="accent6"/>
-          </a:effectRef>
-          <a:fontRef idx="minor">
-            <a:schemeClr val="dk1"/>
-          </a:fontRef>
-        </p:style>
-        <p:txBody>
-          <a:bodyPr rtlCol="0" anchor="ctr"/>
-          <a:lstStyle/>
-          <a:p>
-            <a:pPr algn="ctr"/>
-            <a:endParaRPr lang="en-US" sz="1050"/>
-          </a:p>
-        </p:txBody>
-      </p:sp>
-      <p:sp>
-        <p:nvSpPr>
-          <p:cNvPr id="115" name="Flowchart: Decision 96"/>
-          <p:cNvSpPr/>
-          <p:nvPr/>
-        </p:nvSpPr>
-        <p:spPr>
-          <a:xfrm>
-            <a:off x="7041947" y="4852417"/>
-            <a:ext cx="236048" cy="173380"/>
-          </a:xfrm>
-          <a:prstGeom prst="flowChartDecision">
-            <a:avLst/>
-          </a:prstGeom>
-          <a:solidFill>
-            <a:srgbClr val="7030A0"/>
-          </a:solidFill>
-          <a:ln w="19050">
-            <a:solidFill>
-              <a:srgbClr val="7030A0"/>
-            </a:solidFill>
-          </a:ln>
-          <a:effectLst/>
-        </p:spPr>
-        <p:style>
-          <a:lnRef idx="1">
-            <a:schemeClr val="accent6"/>
-          </a:lnRef>
-          <a:fillRef idx="2">
-            <a:schemeClr val="accent6"/>
-          </a:fillRef>
-          <a:effectRef idx="1">
-            <a:schemeClr val="accent6"/>
-          </a:effectRef>
-          <a:fontRef idx="minor">
-            <a:schemeClr val="dk1"/>
-          </a:fontRef>
-        </p:style>
-        <p:txBody>
-          <a:bodyPr rtlCol="0" anchor="ctr"/>
-          <a:lstStyle/>
-          <a:p>
-            <a:pPr algn="ctr"/>
-            <a:endParaRPr lang="en-US" sz="1050"/>
-          </a:p>
-        </p:txBody>
-      </p:sp>
-      <p:sp>
-        <p:nvSpPr>
-          <p:cNvPr id="116" name="Rectangle 8"/>
-          <p:cNvSpPr/>
-          <p:nvPr/>
-        </p:nvSpPr>
-        <p:spPr>
-          <a:xfrm>
-            <a:off x="7495195" y="4804211"/>
-            <a:ext cx="708186" cy="285783"/>
-          </a:xfrm>
-          <a:prstGeom prst="rect">
-            <a:avLst/>
-          </a:prstGeom>
-          <a:ln w="19050">
-            <a:solidFill>
-              <a:srgbClr val="7030A0"/>
-            </a:solidFill>
-          </a:ln>
-          <a:effectLst/>
-        </p:spPr>
-        <p:style>
-          <a:lnRef idx="1">
-            <a:schemeClr val="accent4"/>
-          </a:lnRef>
-          <a:fillRef idx="2">
-            <a:schemeClr val="accent4"/>
-          </a:fillRef>
-          <a:effectRef idx="1">
-            <a:schemeClr val="accent4"/>
-          </a:effectRef>
-          <a:fontRef idx="minor">
-            <a:schemeClr val="dk1"/>
-          </a:fontRef>
-        </p:style>
-        <p:txBody>
-          <a:bodyPr rtlCol="0" anchor="ctr"/>
-          <a:lstStyle/>
-          <a:p>
-            <a:pPr algn="ctr"/>
-            <a:r>
-              <a:rPr lang="en-US" sz="1050" dirty="0" smtClean="0">
-                <a:solidFill>
-                  <a:srgbClr val="7030A0"/>
-                </a:solidFill>
-              </a:rPr>
-              <a:t>Name</a:t>
-            </a:r>
-            <a:endParaRPr lang="en-SG" sz="1050" dirty="0">
-              <a:solidFill>
-                <a:srgbClr val="7030A0"/>
-              </a:solidFill>
-            </a:endParaRPr>
-          </a:p>
-        </p:txBody>
-      </p:sp>
-      <p:sp>
-        <p:nvSpPr>
-          <p:cNvPr id="117" name="Rectangle 8"/>
-          <p:cNvSpPr/>
-          <p:nvPr/>
-        </p:nvSpPr>
-        <p:spPr>
-          <a:xfrm>
-            <a:off x="4508316" y="4743815"/>
-            <a:ext cx="1156969" cy="346760"/>
-          </a:xfrm>
-          <a:prstGeom prst="rect">
-            <a:avLst/>
-          </a:prstGeom>
-          <a:ln w="19050">
-            <a:solidFill>
-              <a:srgbClr val="7030A0"/>
-            </a:solidFill>
-          </a:ln>
-          <a:effectLst/>
-        </p:spPr>
-        <p:style>
-          <a:lnRef idx="1">
-            <a:schemeClr val="accent4"/>
-          </a:lnRef>
-          <a:fillRef idx="2">
-            <a:schemeClr val="accent4"/>
-          </a:fillRef>
-          <a:effectRef idx="1">
-            <a:schemeClr val="accent4"/>
-          </a:effectRef>
-          <a:fontRef idx="minor">
-            <a:schemeClr val="dk1"/>
-          </a:fontRef>
-        </p:style>
-        <p:txBody>
-          <a:bodyPr rtlCol="0" anchor="ctr"/>
-          <a:lstStyle/>
-          <a:p>
-            <a:pPr algn="ctr"/>
-            <a:r>
-              <a:rPr lang="en-US" sz="1050" dirty="0" err="1" smtClean="0">
-                <a:solidFill>
-                  <a:srgbClr val="7030A0"/>
-                </a:solidFill>
-              </a:rPr>
-              <a:t>UniqueGroupList</a:t>
-            </a:r>
-            <a:endParaRPr lang="en-SG" sz="1050" dirty="0">
-              <a:solidFill>
-                <a:srgbClr val="7030A0"/>
-              </a:solidFill>
-            </a:endParaRPr>
-          </a:p>
-        </p:txBody>
-      </p:sp>
-      <p:cxnSp>
-        <p:nvCxnSpPr>
-          <p:cNvPr id="121" name="Straight Arrow Connector 120"/>
-          <p:cNvCxnSpPr/>
-          <p:nvPr/>
-        </p:nvCxnSpPr>
-        <p:spPr>
-          <a:xfrm>
-            <a:off x="7277995" y="4937201"/>
-            <a:ext cx="217201" cy="1906"/>
-          </a:xfrm>
-          <a:prstGeom prst="straightConnector1">
-            <a:avLst/>
-          </a:prstGeom>
-          <a:ln w="19050">
-            <a:solidFill>
-              <a:srgbClr val="7030A0"/>
-            </a:solidFill>
-            <a:tailEnd type="triangle"/>
-          </a:ln>
-        </p:spPr>
-        <p:style>
-          <a:lnRef idx="1">
-            <a:schemeClr val="accent1"/>
-          </a:lnRef>
-          <a:fillRef idx="0">
-            <a:schemeClr val="accent1"/>
-          </a:fillRef>
-          <a:effectRef idx="0">
-            <a:schemeClr val="accent1"/>
-          </a:effectRef>
-          <a:fontRef idx="minor">
-            <a:schemeClr val="tx1"/>
-          </a:fontRef>
-        </p:style>
-      </p:cxnSp>
-      <p:cxnSp>
-        <p:nvCxnSpPr>
-          <p:cNvPr id="126" name="Elbow Connector 125"/>
-          <p:cNvCxnSpPr/>
-          <p:nvPr/>
-        </p:nvCxnSpPr>
-        <p:spPr>
-          <a:xfrm rot="5400000">
-            <a:off x="5477748" y="3572860"/>
-            <a:ext cx="1232027" cy="1127528"/>
-          </a:xfrm>
-          <a:prstGeom prst="bentConnector3">
-            <a:avLst/>
-          </a:prstGeom>
-          <a:ln w="19050">
-            <a:solidFill>
-              <a:srgbClr val="7030A0"/>
-            </a:solidFill>
-            <a:tailEnd type="triangle"/>
-          </a:ln>
-        </p:spPr>
-        <p:style>
-          <a:lnRef idx="1">
-            <a:schemeClr val="accent1"/>
-          </a:lnRef>
-          <a:fillRef idx="0">
-            <a:schemeClr val="accent1"/>
-          </a:fillRef>
-          <a:effectRef idx="0">
-            <a:schemeClr val="accent1"/>
-          </a:effectRef>
-          <a:fontRef idx="minor">
-            <a:schemeClr val="tx1"/>
-          </a:fontRef>
-        </p:style>
-      </p:cxnSp>
-      <p:cxnSp>
-        <p:nvCxnSpPr>
-          <p:cNvPr id="129" name="Straight Connector 128"/>
-          <p:cNvCxnSpPr>
-            <a:endCxn id="62" idx="2"/>
-          </p:cNvCxnSpPr>
-          <p:nvPr/>
-        </p:nvCxnSpPr>
-        <p:spPr>
-          <a:xfrm flipV="1">
-            <a:off x="6657526" y="3204826"/>
-            <a:ext cx="10244" cy="317293"/>
-          </a:xfrm>
-          <a:prstGeom prst="line">
-            <a:avLst/>
-          </a:prstGeom>
-          <a:ln w="19050">
-            <a:solidFill>
-              <a:srgbClr val="7030A0"/>
-            </a:solidFill>
-          </a:ln>
-        </p:spPr>
-        <p:style>
-          <a:lnRef idx="1">
-            <a:schemeClr val="accent1"/>
-          </a:lnRef>
-          <a:fillRef idx="0">
-            <a:schemeClr val="accent1"/>
-          </a:fillRef>
-          <a:effectRef idx="0">
-            <a:schemeClr val="accent1"/>
-          </a:effectRef>
-          <a:fontRef idx="minor">
-            <a:schemeClr val="tx1"/>
-          </a:fontRef>
-        </p:style>
-      </p:cxnSp>
-      <p:sp>
-        <p:nvSpPr>
-          <p:cNvPr id="130" name="TextBox 129"/>
-          <p:cNvSpPr txBox="1"/>
-          <p:nvPr/>
-        </p:nvSpPr>
-        <p:spPr>
-          <a:xfrm>
-            <a:off x="5330482" y="4542411"/>
-            <a:ext cx="189257" cy="178683"/>
-          </a:xfrm>
-          <a:prstGeom prst="rect">
-            <a:avLst/>
-          </a:prstGeom>
-          <a:noFill/>
-        </p:spPr>
-        <p:txBody>
-          <a:bodyPr wrap="square" lIns="0" tIns="0" rIns="0" bIns="0" rtlCol="0">
-            <a:noAutofit/>
-          </a:bodyPr>
-          <a:lstStyle/>
-          <a:p>
-            <a:pPr algn="ctr"/>
-            <a:r>
-              <a:rPr lang="en-US" sz="1100" dirty="0" smtClean="0">
-                <a:solidFill>
-                  <a:srgbClr val="7030A0"/>
-                </a:solidFill>
-              </a:rPr>
-              <a:t>1</a:t>
-            </a:r>
-            <a:endParaRPr lang="en-SG" sz="1100" dirty="0">
-              <a:solidFill>
-                <a:srgbClr val="7030A0"/>
-              </a:solidFill>
-            </a:endParaRPr>
-          </a:p>
-        </p:txBody>
-      </p:sp>
-      <p:cxnSp>
-        <p:nvCxnSpPr>
-          <p:cNvPr id="132" name="Straight Connector 131"/>
-          <p:cNvCxnSpPr/>
-          <p:nvPr/>
-        </p:nvCxnSpPr>
-        <p:spPr>
-          <a:xfrm>
-            <a:off x="4348839" y="2974180"/>
-            <a:ext cx="0" cy="1963021"/>
-          </a:xfrm>
-          <a:prstGeom prst="line">
-            <a:avLst/>
-          </a:prstGeom>
-          <a:ln w="19050">
-            <a:solidFill>
-              <a:srgbClr val="7030A0"/>
-            </a:solidFill>
-          </a:ln>
-        </p:spPr>
-        <p:style>
-          <a:lnRef idx="1">
-            <a:schemeClr val="accent1"/>
-          </a:lnRef>
-          <a:fillRef idx="0">
-            <a:schemeClr val="accent1"/>
-          </a:fillRef>
-          <a:effectRef idx="0">
-            <a:schemeClr val="accent1"/>
-          </a:effectRef>
-          <a:fontRef idx="minor">
-            <a:schemeClr val="tx1"/>
-          </a:fontRef>
-        </p:style>
-      </p:cxnSp>
-      <p:cxnSp>
-        <p:nvCxnSpPr>
-          <p:cNvPr id="133" name="Straight Arrow Connector 132"/>
-          <p:cNvCxnSpPr/>
-          <p:nvPr/>
-        </p:nvCxnSpPr>
-        <p:spPr>
-          <a:xfrm>
-            <a:off x="4342160" y="4932201"/>
-            <a:ext cx="217201" cy="1906"/>
-          </a:xfrm>
-          <a:prstGeom prst="straightConnector1">
-            <a:avLst/>
-          </a:prstGeom>
-          <a:ln w="19050">
-            <a:solidFill>
-              <a:srgbClr val="7030A0"/>
-            </a:solidFill>
-            <a:tailEnd type="triangle"/>
-          </a:ln>
-        </p:spPr>
-        <p:style>
-          <a:lnRef idx="1">
-            <a:schemeClr val="accent1"/>
-          </a:lnRef>
-          <a:fillRef idx="0">
-            <a:schemeClr val="accent1"/>
-          </a:fillRef>
-          <a:effectRef idx="0">
-            <a:schemeClr val="accent1"/>
-          </a:effectRef>
-          <a:fontRef idx="minor">
-            <a:schemeClr val="tx1"/>
-          </a:fontRef>
-        </p:style>
-      </p:cxnSp>
-      <p:sp>
-        <p:nvSpPr>
-          <p:cNvPr id="136" name="TextBox 135"/>
-          <p:cNvSpPr txBox="1"/>
-          <p:nvPr/>
-        </p:nvSpPr>
-        <p:spPr>
-          <a:xfrm>
-            <a:off x="4324972" y="4990126"/>
             <a:ext cx="189257" cy="178683"/>
           </a:xfrm>
           <a:prstGeom prst="rect">

</xml_diff>